<commit_message>
changed initial conditions in presentation
</commit_message>
<xml_diff>
--- a/Documents/lab Meetings/24-03-15/Polymer Reconstruction Using the HiC Experiments.pptx
+++ b/Documents/lab Meetings/24-03-15/Polymer Reconstruction Using the HiC Experiments.pptx
@@ -248,7 +248,7 @@
           <a:p>
             <a:fld id="{1B761F61-2ED9-454D-9C2F-80881C5F47F6}" type="datetimeFigureOut">
               <a:rPr lang="en-US" smtClean="0"/>
-              <a:t>3/20/2015</a:t>
+              <a:t>3/23/2015</a:t>
             </a:fld>
             <a:endParaRPr lang="en-US"/>
           </a:p>
@@ -418,7 +418,7 @@
           <a:p>
             <a:fld id="{1B761F61-2ED9-454D-9C2F-80881C5F47F6}" type="datetimeFigureOut">
               <a:rPr lang="en-US" smtClean="0"/>
-              <a:t>3/20/2015</a:t>
+              <a:t>3/23/2015</a:t>
             </a:fld>
             <a:endParaRPr lang="en-US"/>
           </a:p>
@@ -598,7 +598,7 @@
           <a:p>
             <a:fld id="{1B761F61-2ED9-454D-9C2F-80881C5F47F6}" type="datetimeFigureOut">
               <a:rPr lang="en-US" smtClean="0"/>
-              <a:t>3/20/2015</a:t>
+              <a:t>3/23/2015</a:t>
             </a:fld>
             <a:endParaRPr lang="en-US"/>
           </a:p>
@@ -768,7 +768,7 @@
           <a:p>
             <a:fld id="{1B761F61-2ED9-454D-9C2F-80881C5F47F6}" type="datetimeFigureOut">
               <a:rPr lang="en-US" smtClean="0"/>
-              <a:t>3/20/2015</a:t>
+              <a:t>3/23/2015</a:t>
             </a:fld>
             <a:endParaRPr lang="en-US"/>
           </a:p>
@@ -1014,7 +1014,7 @@
           <a:p>
             <a:fld id="{1B761F61-2ED9-454D-9C2F-80881C5F47F6}" type="datetimeFigureOut">
               <a:rPr lang="en-US" smtClean="0"/>
-              <a:t>3/20/2015</a:t>
+              <a:t>3/23/2015</a:t>
             </a:fld>
             <a:endParaRPr lang="en-US"/>
           </a:p>
@@ -1246,7 +1246,7 @@
           <a:p>
             <a:fld id="{1B761F61-2ED9-454D-9C2F-80881C5F47F6}" type="datetimeFigureOut">
               <a:rPr lang="en-US" smtClean="0"/>
-              <a:t>3/20/2015</a:t>
+              <a:t>3/23/2015</a:t>
             </a:fld>
             <a:endParaRPr lang="en-US"/>
           </a:p>
@@ -1613,7 +1613,7 @@
           <a:p>
             <a:fld id="{1B761F61-2ED9-454D-9C2F-80881C5F47F6}" type="datetimeFigureOut">
               <a:rPr lang="en-US" smtClean="0"/>
-              <a:t>3/20/2015</a:t>
+              <a:t>3/23/2015</a:t>
             </a:fld>
             <a:endParaRPr lang="en-US"/>
           </a:p>
@@ -1731,7 +1731,7 @@
           <a:p>
             <a:fld id="{1B761F61-2ED9-454D-9C2F-80881C5F47F6}" type="datetimeFigureOut">
               <a:rPr lang="en-US" smtClean="0"/>
-              <a:t>3/20/2015</a:t>
+              <a:t>3/23/2015</a:t>
             </a:fld>
             <a:endParaRPr lang="en-US"/>
           </a:p>
@@ -1826,7 +1826,7 @@
           <a:p>
             <a:fld id="{1B761F61-2ED9-454D-9C2F-80881C5F47F6}" type="datetimeFigureOut">
               <a:rPr lang="en-US" smtClean="0"/>
-              <a:t>3/20/2015</a:t>
+              <a:t>3/23/2015</a:t>
             </a:fld>
             <a:endParaRPr lang="en-US"/>
           </a:p>
@@ -2103,7 +2103,7 @@
           <a:p>
             <a:fld id="{1B761F61-2ED9-454D-9C2F-80881C5F47F6}" type="datetimeFigureOut">
               <a:rPr lang="en-US" smtClean="0"/>
-              <a:t>3/20/2015</a:t>
+              <a:t>3/23/2015</a:t>
             </a:fld>
             <a:endParaRPr lang="en-US"/>
           </a:p>
@@ -2356,7 +2356,7 @@
           <a:p>
             <a:fld id="{1B761F61-2ED9-454D-9C2F-80881C5F47F6}" type="datetimeFigureOut">
               <a:rPr lang="en-US" smtClean="0"/>
-              <a:t>3/20/2015</a:t>
+              <a:t>3/23/2015</a:t>
             </a:fld>
             <a:endParaRPr lang="en-US"/>
           </a:p>
@@ -2569,7 +2569,7 @@
           <a:p>
             <a:fld id="{1B761F61-2ED9-454D-9C2F-80881C5F47F6}" type="datetimeFigureOut">
               <a:rPr lang="en-US" smtClean="0"/>
-              <a:t>3/20/2015</a:t>
+              <a:t>3/23/2015</a:t>
             </a:fld>
             <a:endParaRPr lang="en-US"/>
           </a:p>
@@ -3538,8 +3538,8 @@
           </a:p>
         </p:txBody>
       </p:sp>
-      <mc:AlternateContent xmlns:mc="http://schemas.openxmlformats.org/markup-compatibility/2006">
-        <mc:Choice xmlns:a14="http://schemas.microsoft.com/office/drawing/2010/main" Requires="a14">
+      <mc:AlternateContent xmlns:mc="http://schemas.openxmlformats.org/markup-compatibility/2006" xmlns:a14="http://schemas.microsoft.com/office/drawing/2010/main">
+        <mc:Choice Requires="a14">
           <p:sp>
             <p:nvSpPr>
               <p:cNvPr id="19" name="TextBox 18"/>
@@ -3562,6 +3562,7 @@
               </a:bodyPr>
               <a:lstStyle/>
               <a:p>
+                <a:pPr/>
                 <a14:m>
                   <m:oMathPara xmlns:m="http://schemas.openxmlformats.org/officeDocument/2006/math">
                     <m:oMathParaPr>
@@ -3677,7 +3678,7 @@
             </p:txBody>
           </p:sp>
         </mc:Choice>
-        <mc:Fallback>
+        <mc:Fallback xmlns="">
           <p:sp>
             <p:nvSpPr>
               <p:cNvPr id="19" name="TextBox 18"/>
@@ -3716,8 +3717,8 @@
           </p:sp>
         </mc:Fallback>
       </mc:AlternateContent>
-      <mc:AlternateContent xmlns:mc="http://schemas.openxmlformats.org/markup-compatibility/2006">
-        <mc:Choice xmlns:a14="http://schemas.microsoft.com/office/drawing/2010/main" Requires="a14">
+      <mc:AlternateContent xmlns:mc="http://schemas.openxmlformats.org/markup-compatibility/2006" xmlns:a14="http://schemas.microsoft.com/office/drawing/2010/main">
+        <mc:Choice Requires="a14">
           <p:sp>
             <p:nvSpPr>
               <p:cNvPr id="20" name="TextBox 19"/>
@@ -3756,7 +3757,25 @@
                       <a:rPr lang="en-US" b="0" i="1" smtClean="0">
                         <a:latin typeface="Cambria Math" panose="02040503050406030204" pitchFamily="18" charset="0"/>
                       </a:rPr>
-                      <m:t>=0.5</m:t>
+                      <m:t>=</m:t>
+                    </m:r>
+                    <m:r>
+                      <a:rPr lang="en-US" b="0" i="1" smtClean="0">
+                        <a:latin typeface="Cambria Math" panose="02040503050406030204" pitchFamily="18" charset="0"/>
+                      </a:rPr>
+                      <m:t>0</m:t>
+                    </m:r>
+                    <m:r>
+                      <a:rPr lang="en-US" b="0" i="1" smtClean="0">
+                        <a:latin typeface="Cambria Math" panose="02040503050406030204" pitchFamily="18" charset="0"/>
+                      </a:rPr>
+                      <m:t>.</m:t>
+                    </m:r>
+                    <m:r>
+                      <a:rPr lang="en-US" b="0" i="1" smtClean="0">
+                        <a:latin typeface="Cambria Math" panose="02040503050406030204" pitchFamily="18" charset="0"/>
+                      </a:rPr>
+                      <m:t>5</m:t>
                     </m:r>
                   </m:oMath>
                 </a14:m>
@@ -3771,7 +3790,7 @@
             </p:txBody>
           </p:sp>
         </mc:Choice>
-        <mc:Fallback>
+        <mc:Fallback xmlns="">
           <p:sp>
             <p:nvSpPr>
               <p:cNvPr id="20" name="TextBox 19"/>
@@ -3942,7 +3961,13 @@
                               <a:rPr lang="en-US" b="0" i="1" smtClean="0">
                                 <a:latin typeface="Cambria Math" panose="02040503050406030204" pitchFamily="18" charset="0"/>
                               </a:rPr>
-                              <m:t>1,   </m:t>
+                              <m:t>1</m:t>
+                            </m:r>
+                            <m:r>
+                              <a:rPr lang="en-US" b="0" i="1" smtClean="0">
+                                <a:latin typeface="Cambria Math" panose="02040503050406030204" pitchFamily="18" charset="0"/>
+                              </a:rPr>
+                              <m:t>,   </m:t>
                             </m:r>
                             <m:r>
                               <a:rPr lang="en-US" b="0" i="1" smtClean="0">
@@ -3954,7 +3979,13 @@
                               <a:rPr lang="en-US" b="0" i="1" smtClean="0">
                                 <a:latin typeface="Cambria Math" panose="02040503050406030204" pitchFamily="18" charset="0"/>
                               </a:rPr>
-                              <m:t>=0.5</m:t>
+                              <m:t>=</m:t>
+                            </m:r>
+                            <m:r>
+                              <a:rPr lang="en-US" b="0" i="1" smtClean="0">
+                                <a:latin typeface="Cambria Math" panose="02040503050406030204" pitchFamily="18" charset="0"/>
+                              </a:rPr>
+                              <m:t>0</m:t>
                             </m:r>
                           </m:e>
                           <m:e>
@@ -3962,7 +3993,13 @@
                               <a:rPr lang="en-US" b="0" i="1" smtClean="0">
                                 <a:latin typeface="Cambria Math" panose="02040503050406030204" pitchFamily="18" charset="0"/>
                               </a:rPr>
-                              <m:t>0,       </m:t>
+                              <m:t>0</m:t>
+                            </m:r>
+                            <m:r>
+                              <a:rPr lang="en-US" b="0" i="1" smtClean="0">
+                                <a:latin typeface="Cambria Math" panose="02040503050406030204" pitchFamily="18" charset="0"/>
+                              </a:rPr>
+                              <m:t>,       </m:t>
                             </m:r>
                             <m:r>
                               <a:rPr lang="en-US" b="0" i="1" smtClean="0">
@@ -3993,6 +4030,7 @@
                 </a:endParaRPr>
               </a:p>
               <a:p>
+                <a:pPr/>
                 <a14:m>
                   <m:oMathPara xmlns:m="http://schemas.openxmlformats.org/officeDocument/2006/math">
                     <m:oMathParaPr>
@@ -4000,17 +4038,16 @@
                     </m:oMathParaPr>
                     <m:oMath xmlns:m="http://schemas.openxmlformats.org/officeDocument/2006/math">
                       <m:r>
-                        <a:rPr lang="en-US" i="1">
+                        <a:rPr lang="en-US" b="0" i="1" smtClean="0">
                           <a:latin typeface="Cambria Math" panose="02040503050406030204" pitchFamily="18" charset="0"/>
                         </a:rPr>
                         <m:t>𝛼</m:t>
                       </m:r>
                       <m:r>
-                        <a:rPr lang="en-US" i="1">
+                        <a:rPr lang="en-US" b="0" i="1" smtClean="0">
                           <a:latin typeface="Cambria Math" panose="02040503050406030204" pitchFamily="18" charset="0"/>
-                          <a:ea typeface="Cambria Math" panose="02040503050406030204" pitchFamily="18" charset="0"/>
                         </a:rPr>
-                        <m:t>≪</m:t>
+                        <m:t>=−</m:t>
                       </m:r>
                       <m:r>
                         <a:rPr lang="en-US" i="1">
@@ -4052,7 +4089,13 @@
                           <a:rPr lang="en-US" b="0" i="1" smtClean="0">
                             <a:latin typeface="Cambria Math" panose="02040503050406030204" pitchFamily="18" charset="0"/>
                           </a:rPr>
-                          <m:t>0,</m:t>
+                          <m:t>0</m:t>
+                        </m:r>
+                        <m:r>
+                          <a:rPr lang="en-US" b="0" i="1" smtClean="0">
+                            <a:latin typeface="Cambria Math" panose="02040503050406030204" pitchFamily="18" charset="0"/>
+                          </a:rPr>
+                          <m:t>,</m:t>
                         </m:r>
                         <m:r>
                           <a:rPr lang="en-US" b="0" i="1" smtClean="0">
@@ -4087,7 +4130,13 @@
                           <a:rPr lang="en-US" b="0" i="1" smtClean="0">
                             <a:latin typeface="Cambria Math" panose="02040503050406030204" pitchFamily="18" charset="0"/>
                           </a:rPr>
-                          <m:t>1,</m:t>
+                          <m:t>1</m:t>
+                        </m:r>
+                        <m:r>
+                          <a:rPr lang="en-US" b="0" i="1" smtClean="0">
+                            <a:latin typeface="Cambria Math" panose="02040503050406030204" pitchFamily="18" charset="0"/>
+                          </a:rPr>
+                          <m:t>,</m:t>
                         </m:r>
                         <m:r>
                           <a:rPr lang="en-US" b="0" i="1" smtClean="0">
@@ -4141,7 +4190,13 @@
                           <a:rPr lang="en-US" b="0" i="1" smtClean="0">
                             <a:latin typeface="Cambria Math" panose="02040503050406030204" pitchFamily="18" charset="0"/>
                           </a:rPr>
-                          <m:t>0,</m:t>
+                          <m:t>0</m:t>
+                        </m:r>
+                        <m:r>
+                          <a:rPr lang="en-US" b="0" i="1" smtClean="0">
+                            <a:latin typeface="Cambria Math" panose="02040503050406030204" pitchFamily="18" charset="0"/>
+                          </a:rPr>
+                          <m:t>,</m:t>
                         </m:r>
                         <m:r>
                           <a:rPr lang="en-US" b="0" i="1" smtClean="0">
@@ -4182,7 +4237,13 @@
                           <a:rPr lang="en-US" b="0" i="1" smtClean="0">
                             <a:latin typeface="Cambria Math" panose="02040503050406030204" pitchFamily="18" charset="0"/>
                           </a:rPr>
-                          <m:t>0,</m:t>
+                          <m:t>0</m:t>
+                        </m:r>
+                        <m:r>
+                          <a:rPr lang="en-US" b="0" i="1" smtClean="0">
+                            <a:latin typeface="Cambria Math" panose="02040503050406030204" pitchFamily="18" charset="0"/>
+                          </a:rPr>
+                          <m:t>,</m:t>
                         </m:r>
                         <m:r>
                           <a:rPr lang="en-US" b="0" i="1" smtClean="0">
@@ -4196,7 +4257,13 @@
                       <a:rPr lang="en-US" b="0" i="1" smtClean="0">
                         <a:latin typeface="Cambria Math" panose="02040503050406030204" pitchFamily="18" charset="0"/>
                       </a:rPr>
-                      <m:t>=0</m:t>
+                      <m:t>=</m:t>
+                    </m:r>
+                    <m:r>
+                      <a:rPr lang="en-US" b="0" i="1" smtClean="0">
+                        <a:latin typeface="Cambria Math" panose="02040503050406030204" pitchFamily="18" charset="0"/>
+                      </a:rPr>
+                      <m:t>0</m:t>
                     </m:r>
                   </m:oMath>
                 </a14:m>
@@ -4238,7 +4305,7 @@
               <a:lstStyle/>
               <a:p>
                 <a:r>
-                  <a:rPr lang="en-US">
+                  <a:rPr lang="he-IL">
                     <a:noFill/>
                   </a:rPr>
                   <a:t> </a:t>
@@ -4330,8 +4397,8 @@
           </a:fontRef>
         </p:style>
       </p:cxnSp>
-      <mc:AlternateContent xmlns:mc="http://schemas.openxmlformats.org/markup-compatibility/2006">
-        <mc:Choice xmlns:a14="http://schemas.microsoft.com/office/drawing/2010/main" Requires="a14">
+      <mc:AlternateContent xmlns:mc="http://schemas.openxmlformats.org/markup-compatibility/2006" xmlns:a14="http://schemas.microsoft.com/office/drawing/2010/main">
+        <mc:Choice Requires="a14">
           <p:sp>
             <p:nvSpPr>
               <p:cNvPr id="29" name="TextBox 28"/>
@@ -4354,6 +4421,7 @@
               </a:bodyPr>
               <a:lstStyle/>
               <a:p>
+                <a:pPr/>
                 <a14:m>
                   <m:oMathPara xmlns:m="http://schemas.openxmlformats.org/officeDocument/2006/math">
                     <m:oMathParaPr>
@@ -4382,7 +4450,19 @@
                         <a:rPr lang="en-US" b="0" i="1" smtClean="0">
                           <a:latin typeface="Cambria Math" panose="02040503050406030204" pitchFamily="18" charset="0"/>
                         </a:rPr>
-                        <m:t>,0)</m:t>
+                        <m:t>,</m:t>
+                      </m:r>
+                      <m:r>
+                        <a:rPr lang="en-US" b="0" i="1" smtClean="0">
+                          <a:latin typeface="Cambria Math" panose="02040503050406030204" pitchFamily="18" charset="0"/>
+                        </a:rPr>
+                        <m:t>0</m:t>
+                      </m:r>
+                      <m:r>
+                        <a:rPr lang="en-US" b="0" i="1" smtClean="0">
+                          <a:latin typeface="Cambria Math" panose="02040503050406030204" pitchFamily="18" charset="0"/>
+                        </a:rPr>
+                        <m:t>)</m:t>
                       </m:r>
                     </m:oMath>
                   </m:oMathPara>
@@ -4392,7 +4472,7 @@
             </p:txBody>
           </p:sp>
         </mc:Choice>
-        <mc:Fallback>
+        <mc:Fallback xmlns="">
           <p:sp>
             <p:nvSpPr>
               <p:cNvPr id="29" name="TextBox 28"/>
@@ -5604,8 +5684,8 @@
           </a:fontRef>
         </p:style>
       </p:cxnSp>
-      <mc:AlternateContent xmlns:mc="http://schemas.openxmlformats.org/markup-compatibility/2006">
-        <mc:Choice xmlns:a14="http://schemas.microsoft.com/office/drawing/2010/main" Requires="a14">
+      <mc:AlternateContent xmlns:mc="http://schemas.openxmlformats.org/markup-compatibility/2006" xmlns:a14="http://schemas.microsoft.com/office/drawing/2010/main">
+        <mc:Choice Requires="a14">
           <p:sp>
             <p:nvSpPr>
               <p:cNvPr id="109" name="TextBox 108"/>
@@ -5628,6 +5708,7 @@
               </a:bodyPr>
               <a:lstStyle/>
               <a:p>
+                <a:pPr/>
                 <a14:m>
                   <m:oMathPara xmlns:m="http://schemas.openxmlformats.org/officeDocument/2006/math">
                     <m:oMathParaPr>
@@ -5653,7 +5734,13 @@
                             <a:rPr lang="en-US" b="0" i="1" smtClean="0">
                               <a:latin typeface="Cambria Math" panose="02040503050406030204" pitchFamily="18" charset="0"/>
                             </a:rPr>
-                            <m:t>0,</m:t>
+                            <m:t>0</m:t>
+                          </m:r>
+                          <m:r>
+                            <a:rPr lang="en-US" b="0" i="1" smtClean="0">
+                              <a:latin typeface="Cambria Math" panose="02040503050406030204" pitchFamily="18" charset="0"/>
+                            </a:rPr>
+                            <m:t>,</m:t>
                           </m:r>
                           <m:r>
                             <a:rPr lang="en-US" b="0" i="1" smtClean="0">
@@ -5667,7 +5754,13 @@
                         <a:rPr lang="en-US" b="0" i="1" smtClean="0">
                           <a:latin typeface="Cambria Math" panose="02040503050406030204" pitchFamily="18" charset="0"/>
                         </a:rPr>
-                        <m:t>=0</m:t>
+                        <m:t>=</m:t>
+                      </m:r>
+                      <m:r>
+                        <a:rPr lang="en-US" b="0" i="1" smtClean="0">
+                          <a:latin typeface="Cambria Math" panose="02040503050406030204" pitchFamily="18" charset="0"/>
+                        </a:rPr>
+                        <m:t>0</m:t>
                       </m:r>
                     </m:oMath>
                   </m:oMathPara>
@@ -5675,6 +5768,7 @@
                 <a:endParaRPr lang="en-US" b="0" dirty="0" smtClean="0"/>
               </a:p>
               <a:p>
+                <a:pPr/>
                 <a14:m>
                   <m:oMathPara xmlns:m="http://schemas.openxmlformats.org/officeDocument/2006/math">
                     <m:oMathParaPr>
@@ -5719,7 +5813,13 @@
                             <a:rPr lang="en-US" b="0" i="1" smtClean="0">
                               <a:latin typeface="Cambria Math" panose="02040503050406030204" pitchFamily="18" charset="0"/>
                             </a:rPr>
-                            <m:t>0,</m:t>
+                            <m:t>0</m:t>
+                          </m:r>
+                          <m:r>
+                            <a:rPr lang="en-US" b="0" i="1" smtClean="0">
+                              <a:latin typeface="Cambria Math" panose="02040503050406030204" pitchFamily="18" charset="0"/>
+                            </a:rPr>
+                            <m:t>,</m:t>
                           </m:r>
                           <m:r>
                             <a:rPr lang="en-US" b="0" i="1" smtClean="0">
@@ -5733,7 +5833,13 @@
                         <a:rPr lang="en-US" b="0" i="1" smtClean="0">
                           <a:latin typeface="Cambria Math" panose="02040503050406030204" pitchFamily="18" charset="0"/>
                         </a:rPr>
-                        <m:t>=0</m:t>
+                        <m:t>=</m:t>
+                      </m:r>
+                      <m:r>
+                        <a:rPr lang="en-US" b="0" i="1" smtClean="0">
+                          <a:latin typeface="Cambria Math" panose="02040503050406030204" pitchFamily="18" charset="0"/>
+                        </a:rPr>
+                        <m:t>0</m:t>
                       </m:r>
                     </m:oMath>
                   </m:oMathPara>
@@ -5743,7 +5849,7 @@
             </p:txBody>
           </p:sp>
         </mc:Choice>
-        <mc:Fallback>
+        <mc:Fallback xmlns="">
           <p:sp>
             <p:nvSpPr>
               <p:cNvPr id="109" name="TextBox 108"/>
@@ -5782,8 +5888,8 @@
           </p:sp>
         </mc:Fallback>
       </mc:AlternateContent>
-      <mc:AlternateContent xmlns:mc="http://schemas.openxmlformats.org/markup-compatibility/2006">
-        <mc:Choice xmlns:a14="http://schemas.microsoft.com/office/drawing/2010/main" Requires="a14">
+      <mc:AlternateContent xmlns:mc="http://schemas.openxmlformats.org/markup-compatibility/2006" xmlns:a14="http://schemas.microsoft.com/office/drawing/2010/main">
+        <mc:Choice Requires="a14">
           <p:sp>
             <p:nvSpPr>
               <p:cNvPr id="110" name="TextBox 109"/>
@@ -5806,6 +5912,7 @@
               </a:bodyPr>
               <a:lstStyle/>
               <a:p>
+                <a:pPr/>
                 <a14:m>
                   <m:oMathPara xmlns:m="http://schemas.openxmlformats.org/officeDocument/2006/math">
                     <m:oMathParaPr>
@@ -5851,7 +5958,13 @@
                         <a:rPr lang="en-US" b="0" i="1" smtClean="0">
                           <a:latin typeface="Cambria Math" panose="02040503050406030204" pitchFamily="18" charset="0"/>
                         </a:rPr>
-                        <m:t>=0</m:t>
+                        <m:t>=</m:t>
+                      </m:r>
+                      <m:r>
+                        <a:rPr lang="en-US" b="0" i="1" smtClean="0">
+                          <a:latin typeface="Cambria Math" panose="02040503050406030204" pitchFamily="18" charset="0"/>
+                        </a:rPr>
+                        <m:t>0</m:t>
                       </m:r>
                     </m:oMath>
                   </m:oMathPara>
@@ -5861,7 +5974,7 @@
             </p:txBody>
           </p:sp>
         </mc:Choice>
-        <mc:Fallback>
+        <mc:Fallback xmlns="">
           <p:sp>
             <p:nvSpPr>
               <p:cNvPr id="110" name="TextBox 109"/>

</xml_diff>